<commit_message>
[FV-RL] Updated PPT file with results of Method 3 for G(t) estimation (fixed window) and the results for a small initial theta (= 1.3)
</commit_message>
<xml_diff>
--- a/RL-002-QueueBlocking/results/RL-SingleServer-PolicyGradient-Results-202111Nov16-MonteCarloOnSmallTheta.pptx
+++ b/RL-002-QueueBlocking/results/RL-SingleServer-PolicyGradient-Results-202111Nov16-MonteCarloOnSmallTheta.pptx
@@ -10,11 +10,17 @@
     <p:sldId id="264" r:id="rId4"/>
     <p:sldId id="265" r:id="rId5"/>
     <p:sldId id="263" r:id="rId6"/>
-    <p:sldId id="258" r:id="rId7"/>
-    <p:sldId id="260" r:id="rId8"/>
-    <p:sldId id="261" r:id="rId9"/>
-    <p:sldId id="262" r:id="rId10"/>
-    <p:sldId id="259" r:id="rId11"/>
+    <p:sldId id="261" r:id="rId7"/>
+    <p:sldId id="262" r:id="rId8"/>
+    <p:sldId id="268" r:id="rId9"/>
+    <p:sldId id="258" r:id="rId10"/>
+    <p:sldId id="260" r:id="rId11"/>
+    <p:sldId id="267" r:id="rId12"/>
+    <p:sldId id="270" r:id="rId13"/>
+    <p:sldId id="271" r:id="rId14"/>
+    <p:sldId id="259" r:id="rId15"/>
+    <p:sldId id="266" r:id="rId16"/>
+    <p:sldId id="269" r:id="rId17"/>
   </p:sldIdLst>
   <p:sldSz cx="12192000" cy="6858000"/>
   <p:notesSz cx="6858000" cy="9144000"/>
@@ -113,6 +119,11 @@
       </a:defRPr>
     </a:lvl9pPr>
   </p:defaultTextStyle>
+  <p:extLst>
+    <p:ext uri="{EFAFB233-063F-42B5-8137-9DF3F51BA10A}">
+      <p15:sldGuideLst xmlns:p15="http://schemas.microsoft.com/office/powerpoint/2012/main"/>
+    </p:ext>
+  </p:extLst>
 </p:presentation>
 </file>
 
@@ -265,7 +276,7 @@
           <a:p>
             <a:fld id="{15C358BE-D42F-4399-9726-18A5E6376916}" type="datetimeFigureOut">
               <a:rPr lang="en-IE" smtClean="0"/>
-              <a:t>16/11/2021</a:t>
+              <a:t>24/11/2021</a:t>
             </a:fld>
             <a:endParaRPr lang="en-IE"/>
           </a:p>
@@ -465,7 +476,7 @@
           <a:p>
             <a:fld id="{15C358BE-D42F-4399-9726-18A5E6376916}" type="datetimeFigureOut">
               <a:rPr lang="en-IE" smtClean="0"/>
-              <a:t>16/11/2021</a:t>
+              <a:t>24/11/2021</a:t>
             </a:fld>
             <a:endParaRPr lang="en-IE"/>
           </a:p>
@@ -675,7 +686,7 @@
           <a:p>
             <a:fld id="{15C358BE-D42F-4399-9726-18A5E6376916}" type="datetimeFigureOut">
               <a:rPr lang="en-IE" smtClean="0"/>
-              <a:t>16/11/2021</a:t>
+              <a:t>24/11/2021</a:t>
             </a:fld>
             <a:endParaRPr lang="en-IE"/>
           </a:p>
@@ -875,7 +886,7 @@
           <a:p>
             <a:fld id="{15C358BE-D42F-4399-9726-18A5E6376916}" type="datetimeFigureOut">
               <a:rPr lang="en-IE" smtClean="0"/>
-              <a:t>16/11/2021</a:t>
+              <a:t>24/11/2021</a:t>
             </a:fld>
             <a:endParaRPr lang="en-IE"/>
           </a:p>
@@ -1151,7 +1162,7 @@
           <a:p>
             <a:fld id="{15C358BE-D42F-4399-9726-18A5E6376916}" type="datetimeFigureOut">
               <a:rPr lang="en-IE" smtClean="0"/>
-              <a:t>16/11/2021</a:t>
+              <a:t>24/11/2021</a:t>
             </a:fld>
             <a:endParaRPr lang="en-IE"/>
           </a:p>
@@ -1419,7 +1430,7 @@
           <a:p>
             <a:fld id="{15C358BE-D42F-4399-9726-18A5E6376916}" type="datetimeFigureOut">
               <a:rPr lang="en-IE" smtClean="0"/>
-              <a:t>16/11/2021</a:t>
+              <a:t>24/11/2021</a:t>
             </a:fld>
             <a:endParaRPr lang="en-IE"/>
           </a:p>
@@ -1834,7 +1845,7 @@
           <a:p>
             <a:fld id="{15C358BE-D42F-4399-9726-18A5E6376916}" type="datetimeFigureOut">
               <a:rPr lang="en-IE" smtClean="0"/>
-              <a:t>16/11/2021</a:t>
+              <a:t>24/11/2021</a:t>
             </a:fld>
             <a:endParaRPr lang="en-IE"/>
           </a:p>
@@ -1976,7 +1987,7 @@
           <a:p>
             <a:fld id="{15C358BE-D42F-4399-9726-18A5E6376916}" type="datetimeFigureOut">
               <a:rPr lang="en-IE" smtClean="0"/>
-              <a:t>16/11/2021</a:t>
+              <a:t>24/11/2021</a:t>
             </a:fld>
             <a:endParaRPr lang="en-IE"/>
           </a:p>
@@ -2089,7 +2100,7 @@
           <a:p>
             <a:fld id="{15C358BE-D42F-4399-9726-18A5E6376916}" type="datetimeFigureOut">
               <a:rPr lang="en-IE" smtClean="0"/>
-              <a:t>16/11/2021</a:t>
+              <a:t>24/11/2021</a:t>
             </a:fld>
             <a:endParaRPr lang="en-IE"/>
           </a:p>
@@ -2402,7 +2413,7 @@
           <a:p>
             <a:fld id="{15C358BE-D42F-4399-9726-18A5E6376916}" type="datetimeFigureOut">
               <a:rPr lang="en-IE" smtClean="0"/>
-              <a:t>16/11/2021</a:t>
+              <a:t>24/11/2021</a:t>
             </a:fld>
             <a:endParaRPr lang="en-IE"/>
           </a:p>
@@ -2691,7 +2702,7 @@
           <a:p>
             <a:fld id="{15C358BE-D42F-4399-9726-18A5E6376916}" type="datetimeFigureOut">
               <a:rPr lang="en-IE" smtClean="0"/>
-              <a:t>16/11/2021</a:t>
+              <a:t>24/11/2021</a:t>
             </a:fld>
             <a:endParaRPr lang="en-IE"/>
           </a:p>
@@ -2934,7 +2945,7 @@
           <a:p>
             <a:fld id="{15C358BE-D42F-4399-9726-18A5E6376916}" type="datetimeFigureOut">
               <a:rPr lang="en-IE" smtClean="0"/>
-              <a:t>16/11/2021</a:t>
+              <a:t>24/11/2021</a:t>
             </a:fld>
             <a:endParaRPr lang="en-IE"/>
           </a:p>
@@ -3509,6 +3520,672 @@
           <p:cNvPr id="2" name="Title 1">
             <a:extLst>
               <a:ext uri="{FF2B5EF4-FFF2-40B4-BE49-F238E27FC236}">
+                <a16:creationId xmlns:a16="http://schemas.microsoft.com/office/drawing/2014/main" id="{A8531199-B88E-427B-A9A4-BDD920A5C605}"/>
+              </a:ext>
+            </a:extLst>
+          </p:cNvPr>
+          <p:cNvSpPr>
+            <a:spLocks noGrp="1"/>
+          </p:cNvSpPr>
+          <p:nvPr>
+            <p:ph type="title"/>
+          </p:nvPr>
+        </p:nvSpPr>
+        <p:spPr>
+          <a:xfrm>
+            <a:off x="829322" y="365125"/>
+            <a:ext cx="10515600" cy="1325563"/>
+          </a:xfrm>
+        </p:spPr>
+        <p:txBody>
+          <a:bodyPr>
+            <a:normAutofit/>
+          </a:bodyPr>
+          <a:lstStyle/>
+          <a:p>
+            <a:pPr algn="ctr"/>
+            <a:r>
+              <a:rPr lang="es-AR" sz="3600" dirty="0" err="1"/>
+              <a:t>Method</a:t>
+            </a:r>
+            <a:r>
+              <a:rPr lang="es-AR" sz="3600" dirty="0"/>
+              <a:t> 2: </a:t>
+            </a:r>
+            <a:r>
+              <a:rPr lang="es-AR" sz="3600" dirty="0" err="1"/>
+              <a:t>Update</a:t>
+            </a:r>
+            <a:r>
+              <a:rPr lang="es-AR" sz="3600" dirty="0"/>
+              <a:t> at </a:t>
+            </a:r>
+            <a:r>
+              <a:rPr lang="es-AR" sz="3600" dirty="0" err="1"/>
+              <a:t>every</a:t>
+            </a:r>
+            <a:r>
+              <a:rPr lang="es-AR" sz="3600" dirty="0"/>
+              <a:t> time step (T = 5,000)</a:t>
+            </a:r>
+            <a:br>
+              <a:rPr lang="es-AR" sz="3600" dirty="0"/>
+            </a:br>
+            <a:r>
+              <a:rPr lang="es-AR" sz="3600" dirty="0"/>
+              <a:t>(</a:t>
+            </a:r>
+            <a:r>
+              <a:rPr lang="es-AR" sz="3600" dirty="0">
+                <a:sym typeface="Symbol" panose="05050102010706020507" pitchFamily="18" charset="2"/>
+              </a:rPr>
+              <a:t> = 1/T, </a:t>
+            </a:r>
+            <a:r>
+              <a:rPr lang="en-IE" sz="3600" dirty="0">
+                <a:sym typeface="Symbol" panose="05050102010706020507" pitchFamily="18" charset="2"/>
+              </a:rPr>
+              <a:t>|</a:t>
+            </a:r>
+            <a:r>
+              <a:rPr lang="en-IE" sz="3600" dirty="0"/>
+              <a:t>delta(</a:t>
+            </a:r>
+            <a:r>
+              <a:rPr lang="en-IE" sz="3600" dirty="0">
+                <a:sym typeface="Symbol" panose="05050102010706020507" pitchFamily="18" charset="2"/>
+              </a:rPr>
+              <a:t>)| &lt;= 1.131</a:t>
+            </a:r>
+            <a:r>
+              <a:rPr lang="es-AR" sz="3600" dirty="0">
+                <a:sym typeface="Symbol" panose="05050102010706020507" pitchFamily="18" charset="2"/>
+              </a:rPr>
+              <a:t>)</a:t>
+            </a:r>
+            <a:endParaRPr lang="en-IE" sz="3600" dirty="0"/>
+          </a:p>
+        </p:txBody>
+      </p:sp>
+      <p:pic>
+        <p:nvPicPr>
+          <p:cNvPr id="5" name="Picture 4">
+            <a:extLst>
+              <a:ext uri="{FF2B5EF4-FFF2-40B4-BE49-F238E27FC236}">
+                <a16:creationId xmlns:a16="http://schemas.microsoft.com/office/drawing/2014/main" id="{771AED9E-CECE-4C4A-B794-3E77B64C0D01}"/>
+              </a:ext>
+            </a:extLst>
+          </p:cNvPr>
+          <p:cNvPicPr>
+            <a:picLocks noChangeAspect="1"/>
+          </p:cNvPicPr>
+          <p:nvPr/>
+        </p:nvPicPr>
+        <p:blipFill>
+          <a:blip r:embed="rId2"/>
+          <a:stretch>
+            <a:fillRect/>
+          </a:stretch>
+        </p:blipFill>
+        <p:spPr>
+          <a:xfrm>
+            <a:off x="1597980" y="1690688"/>
+            <a:ext cx="9510944" cy="4711683"/>
+          </a:xfrm>
+          <a:prstGeom prst="rect">
+            <a:avLst/>
+          </a:prstGeom>
+        </p:spPr>
+      </p:pic>
+      <p:pic>
+        <p:nvPicPr>
+          <p:cNvPr id="6" name="Picture 5">
+            <a:extLst>
+              <a:ext uri="{FF2B5EF4-FFF2-40B4-BE49-F238E27FC236}">
+                <a16:creationId xmlns:a16="http://schemas.microsoft.com/office/drawing/2014/main" id="{61762BA6-5250-47F0-B9EA-4EEF44BC0938}"/>
+              </a:ext>
+            </a:extLst>
+          </p:cNvPr>
+          <p:cNvPicPr>
+            <a:picLocks noChangeAspect="1"/>
+          </p:cNvPicPr>
+          <p:nvPr/>
+        </p:nvPicPr>
+        <p:blipFill>
+          <a:blip r:embed="rId3"/>
+          <a:stretch>
+            <a:fillRect/>
+          </a:stretch>
+        </p:blipFill>
+        <p:spPr>
+          <a:xfrm>
+            <a:off x="6706863" y="2174285"/>
+            <a:ext cx="3416640" cy="1683931"/>
+          </a:xfrm>
+          <a:prstGeom prst="rect">
+            <a:avLst/>
+          </a:prstGeom>
+        </p:spPr>
+      </p:pic>
+    </p:spTree>
+    <p:extLst>
+      <p:ext uri="{BB962C8B-B14F-4D97-AF65-F5344CB8AC3E}">
+        <p14:creationId xmlns:p14="http://schemas.microsoft.com/office/powerpoint/2010/main" val="3361400706"/>
+      </p:ext>
+    </p:extLst>
+  </p:cSld>
+  <p:clrMapOvr>
+    <a:masterClrMapping/>
+  </p:clrMapOvr>
+</p:sld>
+</file>
+
+<file path=ppt/slides/slide11.xml><?xml version="1.0" encoding="utf-8"?>
+<p:sld xmlns:a="http://schemas.openxmlformats.org/drawingml/2006/main" xmlns:r="http://schemas.openxmlformats.org/officeDocument/2006/relationships" xmlns:p="http://schemas.openxmlformats.org/presentationml/2006/main">
+  <p:cSld>
+    <p:spTree>
+      <p:nvGrpSpPr>
+        <p:cNvPr id="1" name=""/>
+        <p:cNvGrpSpPr/>
+        <p:nvPr/>
+      </p:nvGrpSpPr>
+      <p:grpSpPr>
+        <a:xfrm>
+          <a:off x="0" y="0"/>
+          <a:ext cx="0" cy="0"/>
+          <a:chOff x="0" y="0"/>
+          <a:chExt cx="0" cy="0"/>
+        </a:xfrm>
+      </p:grpSpPr>
+      <p:sp>
+        <p:nvSpPr>
+          <p:cNvPr id="2" name="Title 1">
+            <a:extLst>
+              <a:ext uri="{FF2B5EF4-FFF2-40B4-BE49-F238E27FC236}">
+                <a16:creationId xmlns:a16="http://schemas.microsoft.com/office/drawing/2014/main" id="{A8531199-B88E-427B-A9A4-BDD920A5C605}"/>
+              </a:ext>
+            </a:extLst>
+          </p:cNvPr>
+          <p:cNvSpPr>
+            <a:spLocks noGrp="1"/>
+          </p:cNvSpPr>
+          <p:nvPr>
+            <p:ph type="title"/>
+          </p:nvPr>
+        </p:nvSpPr>
+        <p:spPr>
+          <a:xfrm>
+            <a:off x="829322" y="365125"/>
+            <a:ext cx="10515600" cy="1325563"/>
+          </a:xfrm>
+        </p:spPr>
+        <p:txBody>
+          <a:bodyPr>
+            <a:normAutofit/>
+          </a:bodyPr>
+          <a:lstStyle/>
+          <a:p>
+            <a:pPr algn="ctr"/>
+            <a:r>
+              <a:rPr lang="es-AR" sz="3600" dirty="0" err="1"/>
+              <a:t>Method</a:t>
+            </a:r>
+            <a:r>
+              <a:rPr lang="es-AR" sz="3600" dirty="0"/>
+              <a:t> 3: </a:t>
+            </a:r>
+            <a:r>
+              <a:rPr lang="es-AR" sz="3600" dirty="0" err="1"/>
+              <a:t>Update</a:t>
+            </a:r>
+            <a:r>
+              <a:rPr lang="es-AR" sz="3600" dirty="0"/>
+              <a:t> once at </a:t>
+            </a:r>
+            <a:r>
+              <a:rPr lang="es-AR" sz="3600" dirty="0" err="1"/>
+              <a:t>end</a:t>
+            </a:r>
+            <a:r>
+              <a:rPr lang="es-AR" sz="3600" dirty="0"/>
+              <a:t> </a:t>
+            </a:r>
+            <a:r>
+              <a:rPr lang="es-AR" sz="3600" dirty="0" err="1"/>
+              <a:t>of</a:t>
+            </a:r>
+            <a:r>
+              <a:rPr lang="es-AR" sz="3600" dirty="0"/>
+              <a:t> </a:t>
+            </a:r>
+            <a:r>
+              <a:rPr lang="es-AR" sz="3600" dirty="0" err="1"/>
+              <a:t>episode</a:t>
+            </a:r>
+            <a:r>
+              <a:rPr lang="es-AR" sz="3600" dirty="0"/>
+              <a:t> (T = 10,000)</a:t>
+            </a:r>
+            <a:br>
+              <a:rPr lang="es-AR" sz="3600" dirty="0"/>
+            </a:br>
+            <a:r>
+              <a:rPr lang="es-AR" sz="3600" dirty="0"/>
+              <a:t>(</a:t>
+            </a:r>
+            <a:r>
+              <a:rPr lang="es-AR" sz="3600" dirty="0">
+                <a:sym typeface="Symbol" panose="05050102010706020507" pitchFamily="18" charset="2"/>
+              </a:rPr>
+              <a:t> = 1, </a:t>
+            </a:r>
+            <a:r>
+              <a:rPr lang="en-IE" sz="3600" dirty="0">
+                <a:sym typeface="Symbol" panose="05050102010706020507" pitchFamily="18" charset="2"/>
+              </a:rPr>
+              <a:t>|</a:t>
+            </a:r>
+            <a:r>
+              <a:rPr lang="en-IE" sz="3600" dirty="0"/>
+              <a:t>delta(</a:t>
+            </a:r>
+            <a:r>
+              <a:rPr lang="en-IE" sz="3600" dirty="0">
+                <a:sym typeface="Symbol" panose="05050102010706020507" pitchFamily="18" charset="2"/>
+              </a:rPr>
+              <a:t>)| &lt;= 1.131</a:t>
+            </a:r>
+            <a:r>
+              <a:rPr lang="es-AR" sz="3600" dirty="0">
+                <a:sym typeface="Symbol" panose="05050102010706020507" pitchFamily="18" charset="2"/>
+              </a:rPr>
+              <a:t>)</a:t>
+            </a:r>
+            <a:endParaRPr lang="en-IE" sz="3600" dirty="0"/>
+          </a:p>
+        </p:txBody>
+      </p:sp>
+      <p:pic>
+        <p:nvPicPr>
+          <p:cNvPr id="3" name="Picture 2">
+            <a:extLst>
+              <a:ext uri="{FF2B5EF4-FFF2-40B4-BE49-F238E27FC236}">
+                <a16:creationId xmlns:a16="http://schemas.microsoft.com/office/drawing/2014/main" id="{3371EC64-C0BE-4B7C-9A2E-325211671462}"/>
+              </a:ext>
+            </a:extLst>
+          </p:cNvPr>
+          <p:cNvPicPr>
+            <a:picLocks noChangeAspect="1"/>
+          </p:cNvPicPr>
+          <p:nvPr/>
+        </p:nvPicPr>
+        <p:blipFill>
+          <a:blip r:embed="rId2"/>
+          <a:stretch>
+            <a:fillRect/>
+          </a:stretch>
+        </p:blipFill>
+        <p:spPr>
+          <a:xfrm>
+            <a:off x="1320800" y="1690688"/>
+            <a:ext cx="9550400" cy="4680875"/>
+          </a:xfrm>
+          <a:prstGeom prst="rect">
+            <a:avLst/>
+          </a:prstGeom>
+        </p:spPr>
+      </p:pic>
+      <p:pic>
+        <p:nvPicPr>
+          <p:cNvPr id="4" name="Picture 3">
+            <a:extLst>
+              <a:ext uri="{FF2B5EF4-FFF2-40B4-BE49-F238E27FC236}">
+                <a16:creationId xmlns:a16="http://schemas.microsoft.com/office/drawing/2014/main" id="{D3A4AFBC-BFBC-46EC-A53D-A69E2F0239CC}"/>
+              </a:ext>
+            </a:extLst>
+          </p:cNvPr>
+          <p:cNvPicPr>
+            <a:picLocks noChangeAspect="1"/>
+          </p:cNvPicPr>
+          <p:nvPr/>
+        </p:nvPicPr>
+        <p:blipFill>
+          <a:blip r:embed="rId3"/>
+          <a:stretch>
+            <a:fillRect/>
+          </a:stretch>
+        </p:blipFill>
+        <p:spPr>
+          <a:xfrm>
+            <a:off x="6918960" y="1948852"/>
+            <a:ext cx="3261359" cy="1651910"/>
+          </a:xfrm>
+          <a:prstGeom prst="rect">
+            <a:avLst/>
+          </a:prstGeom>
+        </p:spPr>
+      </p:pic>
+    </p:spTree>
+    <p:extLst>
+      <p:ext uri="{BB962C8B-B14F-4D97-AF65-F5344CB8AC3E}">
+        <p14:creationId xmlns:p14="http://schemas.microsoft.com/office/powerpoint/2010/main" val="310114291"/>
+      </p:ext>
+    </p:extLst>
+  </p:cSld>
+  <p:clrMapOvr>
+    <a:masterClrMapping/>
+  </p:clrMapOvr>
+</p:sld>
+</file>
+
+<file path=ppt/slides/slide12.xml><?xml version="1.0" encoding="utf-8"?>
+<p:sld xmlns:a="http://schemas.openxmlformats.org/drawingml/2006/main" xmlns:r="http://schemas.openxmlformats.org/officeDocument/2006/relationships" xmlns:p="http://schemas.openxmlformats.org/presentationml/2006/main">
+  <p:cSld>
+    <p:spTree>
+      <p:nvGrpSpPr>
+        <p:cNvPr id="1" name=""/>
+        <p:cNvGrpSpPr/>
+        <p:nvPr/>
+      </p:nvGrpSpPr>
+      <p:grpSpPr>
+        <a:xfrm>
+          <a:off x="0" y="0"/>
+          <a:ext cx="0" cy="0"/>
+          <a:chOff x="0" y="0"/>
+          <a:chExt cx="0" cy="0"/>
+        </a:xfrm>
+      </p:grpSpPr>
+      <p:sp>
+        <p:nvSpPr>
+          <p:cNvPr id="2" name="Title 1">
+            <a:extLst>
+              <a:ext uri="{FF2B5EF4-FFF2-40B4-BE49-F238E27FC236}">
+                <a16:creationId xmlns:a16="http://schemas.microsoft.com/office/drawing/2014/main" id="{BD620344-D4C7-4DDC-B423-2F39728172BC}"/>
+              </a:ext>
+            </a:extLst>
+          </p:cNvPr>
+          <p:cNvSpPr>
+            <a:spLocks noGrp="1"/>
+          </p:cNvSpPr>
+          <p:nvPr>
+            <p:ph type="title"/>
+          </p:nvPr>
+        </p:nvSpPr>
+        <p:spPr/>
+        <p:txBody>
+          <a:bodyPr>
+            <a:normAutofit/>
+          </a:bodyPr>
+          <a:lstStyle/>
+          <a:p>
+            <a:pPr algn="ctr"/>
+            <a:r>
+              <a:rPr lang="en-IE" sz="3600" dirty="0"/>
+              <a:t>Method 1: T = 5,000, start at </a:t>
+            </a:r>
+            <a:r>
+              <a:rPr lang="en-IE" sz="3600" dirty="0">
+                <a:sym typeface="Symbol" panose="05050102010706020507" pitchFamily="18" charset="2"/>
+              </a:rPr>
+              <a:t> = 1.3 (small)</a:t>
+            </a:r>
+            <a:br>
+              <a:rPr lang="en-IE" sz="3600" dirty="0"/>
+            </a:br>
+            <a:r>
+              <a:rPr lang="en-IE" sz="3600" dirty="0"/>
+              <a:t>(</a:t>
+            </a:r>
+            <a:r>
+              <a:rPr lang="en-IE" sz="3600" dirty="0">
+                <a:sym typeface="Symbol" panose="05050102010706020507" pitchFamily="18" charset="2"/>
+              </a:rPr>
+              <a:t> = 1, </a:t>
+            </a:r>
+            <a:r>
+              <a:rPr lang="es-AR" sz="3600" dirty="0"/>
+              <a:t>no </a:t>
+            </a:r>
+            <a:r>
+              <a:rPr lang="es-AR" sz="3600" dirty="0" err="1"/>
+              <a:t>constraint</a:t>
+            </a:r>
+            <a:r>
+              <a:rPr lang="es-AR" sz="3600" dirty="0"/>
+              <a:t> </a:t>
+            </a:r>
+            <a:r>
+              <a:rPr lang="es-AR" sz="3600" dirty="0" err="1"/>
+              <a:t>on</a:t>
+            </a:r>
+            <a:r>
+              <a:rPr lang="es-AR" sz="3600" dirty="0"/>
+              <a:t> delta(</a:t>
+            </a:r>
+            <a:r>
+              <a:rPr lang="es-AR" sz="3600" dirty="0">
+                <a:sym typeface="Symbol" panose="05050102010706020507" pitchFamily="18" charset="2"/>
+              </a:rPr>
+              <a:t>)</a:t>
+            </a:r>
+            <a:r>
+              <a:rPr lang="en-IE" sz="3600" dirty="0">
+                <a:sym typeface="Symbol" panose="05050102010706020507" pitchFamily="18" charset="2"/>
+              </a:rPr>
+              <a:t>)</a:t>
+            </a:r>
+            <a:endParaRPr lang="en-IE" sz="3600" dirty="0"/>
+          </a:p>
+        </p:txBody>
+      </p:sp>
+      <p:pic>
+        <p:nvPicPr>
+          <p:cNvPr id="3" name="Picture 2">
+            <a:extLst>
+              <a:ext uri="{FF2B5EF4-FFF2-40B4-BE49-F238E27FC236}">
+                <a16:creationId xmlns:a16="http://schemas.microsoft.com/office/drawing/2014/main" id="{3BCEDE3F-215A-49BE-AEF0-5EABD0055DD7}"/>
+              </a:ext>
+            </a:extLst>
+          </p:cNvPr>
+          <p:cNvPicPr>
+            <a:picLocks noChangeAspect="1"/>
+          </p:cNvPicPr>
+          <p:nvPr/>
+        </p:nvPicPr>
+        <p:blipFill>
+          <a:blip r:embed="rId2"/>
+          <a:stretch>
+            <a:fillRect/>
+          </a:stretch>
+        </p:blipFill>
+        <p:spPr>
+          <a:xfrm>
+            <a:off x="1366982" y="1838469"/>
+            <a:ext cx="9605818" cy="4744621"/>
+          </a:xfrm>
+          <a:prstGeom prst="rect">
+            <a:avLst/>
+          </a:prstGeom>
+        </p:spPr>
+      </p:pic>
+    </p:spTree>
+    <p:extLst>
+      <p:ext uri="{BB962C8B-B14F-4D97-AF65-F5344CB8AC3E}">
+        <p14:creationId xmlns:p14="http://schemas.microsoft.com/office/powerpoint/2010/main" val="1444587150"/>
+      </p:ext>
+    </p:extLst>
+  </p:cSld>
+  <p:clrMapOvr>
+    <a:masterClrMapping/>
+  </p:clrMapOvr>
+</p:sld>
+</file>
+
+<file path=ppt/slides/slide13.xml><?xml version="1.0" encoding="utf-8"?>
+<p:sld xmlns:a="http://schemas.openxmlformats.org/drawingml/2006/main" xmlns:r="http://schemas.openxmlformats.org/officeDocument/2006/relationships" xmlns:p="http://schemas.openxmlformats.org/presentationml/2006/main">
+  <p:cSld>
+    <p:spTree>
+      <p:nvGrpSpPr>
+        <p:cNvPr id="1" name=""/>
+        <p:cNvGrpSpPr/>
+        <p:nvPr/>
+      </p:nvGrpSpPr>
+      <p:grpSpPr>
+        <a:xfrm>
+          <a:off x="0" y="0"/>
+          <a:ext cx="0" cy="0"/>
+          <a:chOff x="0" y="0"/>
+          <a:chExt cx="0" cy="0"/>
+        </a:xfrm>
+      </p:grpSpPr>
+      <p:sp>
+        <p:nvSpPr>
+          <p:cNvPr id="2" name="Title 1">
+            <a:extLst>
+              <a:ext uri="{FF2B5EF4-FFF2-40B4-BE49-F238E27FC236}">
+                <a16:creationId xmlns:a16="http://schemas.microsoft.com/office/drawing/2014/main" id="{BD620344-D4C7-4DDC-B423-2F39728172BC}"/>
+              </a:ext>
+            </a:extLst>
+          </p:cNvPr>
+          <p:cNvSpPr>
+            <a:spLocks noGrp="1"/>
+          </p:cNvSpPr>
+          <p:nvPr>
+            <p:ph type="title"/>
+          </p:nvPr>
+        </p:nvSpPr>
+        <p:spPr/>
+        <p:txBody>
+          <a:bodyPr>
+            <a:normAutofit/>
+          </a:bodyPr>
+          <a:lstStyle/>
+          <a:p>
+            <a:pPr algn="ctr"/>
+            <a:r>
+              <a:rPr lang="en-IE" sz="3600" dirty="0"/>
+              <a:t>Method 3: T = 10,000, start at </a:t>
+            </a:r>
+            <a:r>
+              <a:rPr lang="en-IE" sz="3600" dirty="0">
+                <a:sym typeface="Symbol" panose="05050102010706020507" pitchFamily="18" charset="2"/>
+              </a:rPr>
+              <a:t> = 1.3 (small)</a:t>
+            </a:r>
+            <a:br>
+              <a:rPr lang="en-IE" sz="3600" dirty="0"/>
+            </a:br>
+            <a:r>
+              <a:rPr lang="en-IE" sz="3600" dirty="0"/>
+              <a:t>(</a:t>
+            </a:r>
+            <a:r>
+              <a:rPr lang="en-IE" sz="3600" dirty="0">
+                <a:sym typeface="Symbol" panose="05050102010706020507" pitchFamily="18" charset="2"/>
+              </a:rPr>
+              <a:t> = 1, </a:t>
+            </a:r>
+            <a:r>
+              <a:rPr lang="es-AR" sz="3600" dirty="0"/>
+              <a:t>no </a:t>
+            </a:r>
+            <a:r>
+              <a:rPr lang="es-AR" sz="3600" dirty="0" err="1"/>
+              <a:t>constraint</a:t>
+            </a:r>
+            <a:r>
+              <a:rPr lang="es-AR" sz="3600" dirty="0"/>
+              <a:t> </a:t>
+            </a:r>
+            <a:r>
+              <a:rPr lang="es-AR" sz="3600" dirty="0" err="1"/>
+              <a:t>on</a:t>
+            </a:r>
+            <a:r>
+              <a:rPr lang="es-AR" sz="3600" dirty="0"/>
+              <a:t> delta(</a:t>
+            </a:r>
+            <a:r>
+              <a:rPr lang="es-AR" sz="3600" dirty="0">
+                <a:sym typeface="Symbol" panose="05050102010706020507" pitchFamily="18" charset="2"/>
+              </a:rPr>
+              <a:t>)</a:t>
+            </a:r>
+            <a:r>
+              <a:rPr lang="en-IE" sz="3600" dirty="0">
+                <a:sym typeface="Symbol" panose="05050102010706020507" pitchFamily="18" charset="2"/>
+              </a:rPr>
+              <a:t>)</a:t>
+            </a:r>
+            <a:endParaRPr lang="en-IE" sz="3600" dirty="0"/>
+          </a:p>
+        </p:txBody>
+      </p:sp>
+      <p:pic>
+        <p:nvPicPr>
+          <p:cNvPr id="4" name="Picture 3">
+            <a:extLst>
+              <a:ext uri="{FF2B5EF4-FFF2-40B4-BE49-F238E27FC236}">
+                <a16:creationId xmlns:a16="http://schemas.microsoft.com/office/drawing/2014/main" id="{F785B46B-BB12-4465-B7EE-27C139BD48BC}"/>
+              </a:ext>
+            </a:extLst>
+          </p:cNvPr>
+          <p:cNvPicPr>
+            <a:picLocks noChangeAspect="1"/>
+          </p:cNvPicPr>
+          <p:nvPr/>
+        </p:nvPicPr>
+        <p:blipFill>
+          <a:blip r:embed="rId2"/>
+          <a:stretch>
+            <a:fillRect/>
+          </a:stretch>
+        </p:blipFill>
+        <p:spPr>
+          <a:xfrm>
+            <a:off x="978680" y="1690688"/>
+            <a:ext cx="10234640" cy="5042158"/>
+          </a:xfrm>
+          <a:prstGeom prst="rect">
+            <a:avLst/>
+          </a:prstGeom>
+        </p:spPr>
+      </p:pic>
+    </p:spTree>
+    <p:extLst>
+      <p:ext uri="{BB962C8B-B14F-4D97-AF65-F5344CB8AC3E}">
+        <p14:creationId xmlns:p14="http://schemas.microsoft.com/office/powerpoint/2010/main" val="3573871852"/>
+      </p:ext>
+    </p:extLst>
+  </p:cSld>
+  <p:clrMapOvr>
+    <a:masterClrMapping/>
+  </p:clrMapOvr>
+</p:sld>
+</file>
+
+<file path=ppt/slides/slide14.xml><?xml version="1.0" encoding="utf-8"?>
+<p:sld xmlns:a="http://schemas.openxmlformats.org/drawingml/2006/main" xmlns:r="http://schemas.openxmlformats.org/officeDocument/2006/relationships" xmlns:p="http://schemas.openxmlformats.org/presentationml/2006/main">
+  <p:cSld>
+    <p:spTree>
+      <p:nvGrpSpPr>
+        <p:cNvPr id="1" name=""/>
+        <p:cNvGrpSpPr/>
+        <p:nvPr/>
+      </p:nvGrpSpPr>
+      <p:grpSpPr>
+        <a:xfrm>
+          <a:off x="0" y="0"/>
+          <a:ext cx="0" cy="0"/>
+          <a:chOff x="0" y="0"/>
+          <a:chExt cx="0" cy="0"/>
+        </a:xfrm>
+      </p:grpSpPr>
+      <p:sp>
+        <p:nvSpPr>
+          <p:cNvPr id="2" name="Title 1">
+            <a:extLst>
+              <a:ext uri="{FF2B5EF4-FFF2-40B4-BE49-F238E27FC236}">
                 <a16:creationId xmlns:a16="http://schemas.microsoft.com/office/drawing/2014/main" id="{7490EAAA-D8EE-4E4D-A299-9CF916A28FD1}"/>
               </a:ext>
             </a:extLst>
@@ -3525,14 +4202,227 @@
           <a:bodyPr/>
           <a:lstStyle/>
           <a:p>
-            <a:endParaRPr lang="en-IE"/>
-          </a:p>
-        </p:txBody>
-      </p:sp>
+            <a:r>
+              <a:rPr lang="en-IE" dirty="0"/>
+              <a:t>f(s) + g = … (average reward context)</a:t>
+            </a:r>
+            <a:br>
+              <a:rPr lang="en-IE" dirty="0"/>
+            </a:br>
+            <a:r>
+              <a:rPr lang="en-IE" dirty="0"/>
+              <a:t>Ref: conference at Paris on 22-Nov-2021</a:t>
+            </a:r>
+          </a:p>
+        </p:txBody>
+      </p:sp>
+      <p:pic>
+        <p:nvPicPr>
+          <p:cNvPr id="4" name="Picture 3">
+            <a:extLst>
+              <a:ext uri="{FF2B5EF4-FFF2-40B4-BE49-F238E27FC236}">
+                <a16:creationId xmlns:a16="http://schemas.microsoft.com/office/drawing/2014/main" id="{2619F0CB-3F95-47AB-91F4-D718F9A5AB91}"/>
+              </a:ext>
+            </a:extLst>
+          </p:cNvPr>
+          <p:cNvPicPr>
+            <a:picLocks noChangeAspect="1"/>
+          </p:cNvPicPr>
+          <p:nvPr/>
+        </p:nvPicPr>
+        <p:blipFill>
+          <a:blip r:embed="rId2"/>
+          <a:stretch>
+            <a:fillRect/>
+          </a:stretch>
+        </p:blipFill>
+        <p:spPr>
+          <a:xfrm>
+            <a:off x="1397000" y="1779746"/>
+            <a:ext cx="8854440" cy="4791543"/>
+          </a:xfrm>
+          <a:prstGeom prst="rect">
+            <a:avLst/>
+          </a:prstGeom>
+        </p:spPr>
+      </p:pic>
     </p:spTree>
     <p:extLst>
       <p:ext uri="{BB962C8B-B14F-4D97-AF65-F5344CB8AC3E}">
         <p14:creationId xmlns:p14="http://schemas.microsoft.com/office/powerpoint/2010/main" val="2432545725"/>
+      </p:ext>
+    </p:extLst>
+  </p:cSld>
+  <p:clrMapOvr>
+    <a:masterClrMapping/>
+  </p:clrMapOvr>
+</p:sld>
+</file>
+
+<file path=ppt/slides/slide15.xml><?xml version="1.0" encoding="utf-8"?>
+<p:sld xmlns:a="http://schemas.openxmlformats.org/drawingml/2006/main" xmlns:r="http://schemas.openxmlformats.org/officeDocument/2006/relationships" xmlns:p="http://schemas.openxmlformats.org/presentationml/2006/main">
+  <p:cSld>
+    <p:spTree>
+      <p:nvGrpSpPr>
+        <p:cNvPr id="1" name=""/>
+        <p:cNvGrpSpPr/>
+        <p:nvPr/>
+      </p:nvGrpSpPr>
+      <p:grpSpPr>
+        <a:xfrm>
+          <a:off x="0" y="0"/>
+          <a:ext cx="0" cy="0"/>
+          <a:chOff x="0" y="0"/>
+          <a:chExt cx="0" cy="0"/>
+        </a:xfrm>
+      </p:grpSpPr>
+      <p:sp>
+        <p:nvSpPr>
+          <p:cNvPr id="2" name="Title 1">
+            <a:extLst>
+              <a:ext uri="{FF2B5EF4-FFF2-40B4-BE49-F238E27FC236}">
+                <a16:creationId xmlns:a16="http://schemas.microsoft.com/office/drawing/2014/main" id="{97470BC0-92C4-44B3-A45D-D91EAFBCA331}"/>
+              </a:ext>
+            </a:extLst>
+          </p:cNvPr>
+          <p:cNvSpPr>
+            <a:spLocks noGrp="1"/>
+          </p:cNvSpPr>
+          <p:nvPr>
+            <p:ph type="title"/>
+          </p:nvPr>
+        </p:nvSpPr>
+        <p:spPr/>
+        <p:txBody>
+          <a:bodyPr/>
+          <a:lstStyle/>
+          <a:p>
+            <a:r>
+              <a:rPr lang="en-IE" dirty="0"/>
+              <a:t>f(s) + g = … cont’d</a:t>
+            </a:r>
+          </a:p>
+        </p:txBody>
+      </p:sp>
+      <p:pic>
+        <p:nvPicPr>
+          <p:cNvPr id="3" name="Picture 2">
+            <a:extLst>
+              <a:ext uri="{FF2B5EF4-FFF2-40B4-BE49-F238E27FC236}">
+                <a16:creationId xmlns:a16="http://schemas.microsoft.com/office/drawing/2014/main" id="{8F369C28-5C56-4344-AAC5-E9F4AF7C0F17}"/>
+              </a:ext>
+            </a:extLst>
+          </p:cNvPr>
+          <p:cNvPicPr>
+            <a:picLocks noChangeAspect="1"/>
+          </p:cNvPicPr>
+          <p:nvPr/>
+        </p:nvPicPr>
+        <p:blipFill>
+          <a:blip r:embed="rId2"/>
+          <a:stretch>
+            <a:fillRect/>
+          </a:stretch>
+        </p:blipFill>
+        <p:spPr>
+          <a:xfrm>
+            <a:off x="1229360" y="1690688"/>
+            <a:ext cx="9337040" cy="5052700"/>
+          </a:xfrm>
+          <a:prstGeom prst="rect">
+            <a:avLst/>
+          </a:prstGeom>
+        </p:spPr>
+      </p:pic>
+    </p:spTree>
+    <p:extLst>
+      <p:ext uri="{BB962C8B-B14F-4D97-AF65-F5344CB8AC3E}">
+        <p14:creationId xmlns:p14="http://schemas.microsoft.com/office/powerpoint/2010/main" val="2676568065"/>
+      </p:ext>
+    </p:extLst>
+  </p:cSld>
+  <p:clrMapOvr>
+    <a:masterClrMapping/>
+  </p:clrMapOvr>
+</p:sld>
+</file>
+
+<file path=ppt/slides/slide16.xml><?xml version="1.0" encoding="utf-8"?>
+<p:sld xmlns:a="http://schemas.openxmlformats.org/drawingml/2006/main" xmlns:r="http://schemas.openxmlformats.org/officeDocument/2006/relationships" xmlns:p="http://schemas.openxmlformats.org/presentationml/2006/main">
+  <p:cSld>
+    <p:spTree>
+      <p:nvGrpSpPr>
+        <p:cNvPr id="1" name=""/>
+        <p:cNvGrpSpPr/>
+        <p:nvPr/>
+      </p:nvGrpSpPr>
+      <p:grpSpPr>
+        <a:xfrm>
+          <a:off x="0" y="0"/>
+          <a:ext cx="0" cy="0"/>
+          <a:chOff x="0" y="0"/>
+          <a:chExt cx="0" cy="0"/>
+        </a:xfrm>
+      </p:grpSpPr>
+      <p:sp>
+        <p:nvSpPr>
+          <p:cNvPr id="2" name="Title 1">
+            <a:extLst>
+              <a:ext uri="{FF2B5EF4-FFF2-40B4-BE49-F238E27FC236}">
+                <a16:creationId xmlns:a16="http://schemas.microsoft.com/office/drawing/2014/main" id="{4F3A8428-FADF-4AE8-A4F5-5B237D627272}"/>
+              </a:ext>
+            </a:extLst>
+          </p:cNvPr>
+          <p:cNvSpPr>
+            <a:spLocks noGrp="1"/>
+          </p:cNvSpPr>
+          <p:nvPr>
+            <p:ph type="title"/>
+          </p:nvPr>
+        </p:nvSpPr>
+        <p:spPr/>
+        <p:txBody>
+          <a:bodyPr/>
+          <a:lstStyle/>
+          <a:p>
+            <a:endParaRPr lang="en-IE" dirty="0"/>
+          </a:p>
+        </p:txBody>
+      </p:sp>
+      <p:pic>
+        <p:nvPicPr>
+          <p:cNvPr id="3" name="Picture 2">
+            <a:extLst>
+              <a:ext uri="{FF2B5EF4-FFF2-40B4-BE49-F238E27FC236}">
+                <a16:creationId xmlns:a16="http://schemas.microsoft.com/office/drawing/2014/main" id="{D1CAA0B7-C678-420C-84C3-341EC9C7A830}"/>
+              </a:ext>
+            </a:extLst>
+          </p:cNvPr>
+          <p:cNvPicPr>
+            <a:picLocks noChangeAspect="1"/>
+          </p:cNvPicPr>
+          <p:nvPr/>
+        </p:nvPicPr>
+        <p:blipFill>
+          <a:blip r:embed="rId2"/>
+          <a:stretch>
+            <a:fillRect/>
+          </a:stretch>
+        </p:blipFill>
+        <p:spPr>
+          <a:xfrm>
+            <a:off x="1513840" y="1842664"/>
+            <a:ext cx="8920480" cy="4785466"/>
+          </a:xfrm>
+          <a:prstGeom prst="rect">
+            <a:avLst/>
+          </a:prstGeom>
+        </p:spPr>
+      </p:pic>
+    </p:spTree>
+    <p:extLst>
+      <p:ext uri="{BB962C8B-B14F-4D97-AF65-F5344CB8AC3E}">
+        <p14:creationId xmlns:p14="http://schemas.microsoft.com/office/powerpoint/2010/main" val="3839697555"/>
       </p:ext>
     </p:extLst>
   </p:cSld>
@@ -3691,8 +4581,8 @@
           </a:p>
         </p:txBody>
       </p:sp>
-      <mc:AlternateContent xmlns:mc="http://schemas.openxmlformats.org/markup-compatibility/2006">
-        <mc:Choice xmlns:a14="http://schemas.microsoft.com/office/drawing/2010/main" Requires="a14">
+      <mc:AlternateContent xmlns:mc="http://schemas.openxmlformats.org/markup-compatibility/2006" xmlns:a14="http://schemas.microsoft.com/office/drawing/2010/main">
+        <mc:Choice Requires="a14">
           <p:sp>
             <p:nvSpPr>
               <p:cNvPr id="3" name="Content Placeholder 2">
@@ -4308,7 +5198,7 @@
             </p:txBody>
           </p:sp>
         </mc:Choice>
-        <mc:Fallback>
+        <mc:Fallback xmlns="">
           <p:sp>
             <p:nvSpPr>
               <p:cNvPr id="3" name="Content Placeholder 2">
@@ -4327,7 +5217,7 @@
             </p:nvSpPr>
             <p:spPr>
               <a:blipFill>
-                <a:blip r:embed="rId2"/>
+                <a:blip r:embed="rId7"/>
                 <a:stretch>
                   <a:fillRect l="-812" t="-1961" r="-1275"/>
                 </a:stretch>
@@ -4363,7 +5253,7 @@
           <p:nvPr/>
         </p:nvPicPr>
         <p:blipFill>
-          <a:blip r:embed="rId3"/>
+          <a:blip r:embed="rId8"/>
           <a:stretch>
             <a:fillRect/>
           </a:stretch>
@@ -4710,48 +5600,100 @@
         </p:spPr>
         <p:txBody>
           <a:bodyPr>
-            <a:noAutofit/>
+            <a:normAutofit fontScale="90000"/>
           </a:bodyPr>
           <a:lstStyle/>
           <a:p>
             <a:pPr algn="ctr"/>
             <a:r>
-              <a:rPr lang="en-IE" sz="3600" dirty="0"/>
-              <a:t>Method 1: Update once at end of episode (T=5000)</a:t>
+              <a:rPr lang="es-AR" sz="4000" dirty="0" err="1"/>
+              <a:t>Method</a:t>
+            </a:r>
+            <a:r>
+              <a:rPr lang="es-AR" sz="4000" dirty="0"/>
+              <a:t> 1: </a:t>
+            </a:r>
+            <a:r>
+              <a:rPr lang="es-AR" sz="4000" dirty="0" err="1"/>
+              <a:t>Update</a:t>
+            </a:r>
+            <a:r>
+              <a:rPr lang="es-AR" sz="4000" dirty="0"/>
+              <a:t> once at </a:t>
+            </a:r>
+            <a:r>
+              <a:rPr lang="es-AR" sz="4000" dirty="0" err="1"/>
+              <a:t>end</a:t>
+            </a:r>
+            <a:r>
+              <a:rPr lang="es-AR" sz="4000" dirty="0"/>
+              <a:t> </a:t>
+            </a:r>
+            <a:r>
+              <a:rPr lang="es-AR" sz="4000" dirty="0" err="1"/>
+              <a:t>of</a:t>
+            </a:r>
+            <a:r>
+              <a:rPr lang="es-AR" sz="4000" dirty="0"/>
+              <a:t> </a:t>
+            </a:r>
+            <a:r>
+              <a:rPr lang="es-AR" sz="4000" dirty="0" err="1"/>
+              <a:t>episode</a:t>
+            </a:r>
+            <a:r>
+              <a:rPr lang="es-AR" sz="4000" dirty="0"/>
+              <a:t> (T = 5,000)</a:t>
             </a:r>
             <a:br>
-              <a:rPr lang="en-IE" sz="3600" dirty="0"/>
+              <a:rPr lang="es-AR" sz="4000" dirty="0"/>
             </a:br>
             <a:r>
-              <a:rPr lang="en-IE" sz="3600" dirty="0"/>
+              <a:rPr lang="es-AR" sz="4000" dirty="0"/>
               <a:t>(</a:t>
             </a:r>
             <a:r>
-              <a:rPr lang="en-IE" sz="3600" dirty="0">
+              <a:rPr lang="es-AR" sz="4000" dirty="0">
                 <a:sym typeface="Symbol" panose="05050102010706020507" pitchFamily="18" charset="2"/>
               </a:rPr>
-              <a:t>=1, |</a:t>
-            </a:r>
-            <a:r>
-              <a:rPr lang="en-IE" sz="3600" dirty="0"/>
-              <a:t>delta(</a:t>
-            </a:r>
-            <a:r>
-              <a:rPr lang="en-IE" sz="3600" dirty="0">
+              <a:t> = 1, </a:t>
+            </a:r>
+            <a:r>
+              <a:rPr lang="es-AR" sz="4000" dirty="0"/>
+              <a:t>no </a:t>
+            </a:r>
+            <a:r>
+              <a:rPr lang="es-AR" sz="4000" dirty="0" err="1"/>
+              <a:t>constraint</a:t>
+            </a:r>
+            <a:r>
+              <a:rPr lang="es-AR" sz="4000" dirty="0"/>
+              <a:t> </a:t>
+            </a:r>
+            <a:r>
+              <a:rPr lang="es-AR" sz="4000" dirty="0" err="1"/>
+              <a:t>on</a:t>
+            </a:r>
+            <a:r>
+              <a:rPr lang="es-AR" sz="4000" dirty="0"/>
+              <a:t> delta(</a:t>
+            </a:r>
+            <a:r>
+              <a:rPr lang="es-AR" sz="4000" dirty="0">
                 <a:sym typeface="Symbol" panose="05050102010706020507" pitchFamily="18" charset="2"/>
               </a:rPr>
-              <a:t>)| &lt;= 1.131)</a:t>
-            </a:r>
-            <a:endParaRPr lang="en-IE" sz="3600" dirty="0"/>
+              <a:t>))</a:t>
+            </a:r>
+            <a:endParaRPr lang="en-IE" sz="4000" dirty="0"/>
           </a:p>
         </p:txBody>
       </p:sp>
       <p:pic>
         <p:nvPicPr>
-          <p:cNvPr id="6" name="Picture 5">
-            <a:extLst>
-              <a:ext uri="{FF2B5EF4-FFF2-40B4-BE49-F238E27FC236}">
-                <a16:creationId xmlns:a16="http://schemas.microsoft.com/office/drawing/2014/main" id="{1EB16F07-9B03-4C60-9F23-C8AB252C1007}"/>
+          <p:cNvPr id="3" name="Picture 2">
+            <a:extLst>
+              <a:ext uri="{FF2B5EF4-FFF2-40B4-BE49-F238E27FC236}">
+                <a16:creationId xmlns:a16="http://schemas.microsoft.com/office/drawing/2014/main" id="{9E1873BC-4C5F-4577-A04C-8C4C45FC5ACB}"/>
               </a:ext>
             </a:extLst>
           </p:cNvPr>
@@ -4768,391 +5710,7 @@
         </p:blipFill>
         <p:spPr>
           <a:xfrm>
-            <a:off x="1597980" y="1805074"/>
-            <a:ext cx="9360023" cy="4605907"/>
-          </a:xfrm>
-          <a:prstGeom prst="rect">
-            <a:avLst/>
-          </a:prstGeom>
-        </p:spPr>
-      </p:pic>
-      <p:pic>
-        <p:nvPicPr>
-          <p:cNvPr id="7" name="Picture 6">
-            <a:extLst>
-              <a:ext uri="{FF2B5EF4-FFF2-40B4-BE49-F238E27FC236}">
-                <a16:creationId xmlns:a16="http://schemas.microsoft.com/office/drawing/2014/main" id="{7B6F31BF-C6EE-47AE-A029-C20D63D3AB7C}"/>
-              </a:ext>
-            </a:extLst>
-          </p:cNvPr>
-          <p:cNvPicPr>
-            <a:picLocks noChangeAspect="1"/>
-          </p:cNvPicPr>
-          <p:nvPr/>
-        </p:nvPicPr>
-        <p:blipFill>
-          <a:blip r:embed="rId3"/>
-          <a:stretch>
-            <a:fillRect/>
-          </a:stretch>
-        </p:blipFill>
-        <p:spPr>
-          <a:xfrm>
-            <a:off x="6800494" y="2353355"/>
-            <a:ext cx="3251780" cy="1606086"/>
-          </a:xfrm>
-          <a:prstGeom prst="rect">
-            <a:avLst/>
-          </a:prstGeom>
-        </p:spPr>
-      </p:pic>
-    </p:spTree>
-    <p:extLst>
-      <p:ext uri="{BB962C8B-B14F-4D97-AF65-F5344CB8AC3E}">
-        <p14:creationId xmlns:p14="http://schemas.microsoft.com/office/powerpoint/2010/main" val="2802122110"/>
-      </p:ext>
-    </p:extLst>
-  </p:cSld>
-  <p:clrMapOvr>
-    <a:masterClrMapping/>
-  </p:clrMapOvr>
-</p:sld>
-</file>
-
-<file path=ppt/slides/slide7.xml><?xml version="1.0" encoding="utf-8"?>
-<p:sld xmlns:a="http://schemas.openxmlformats.org/drawingml/2006/main" xmlns:r="http://schemas.openxmlformats.org/officeDocument/2006/relationships" xmlns:p="http://schemas.openxmlformats.org/presentationml/2006/main">
-  <p:cSld>
-    <p:spTree>
-      <p:nvGrpSpPr>
-        <p:cNvPr id="1" name=""/>
-        <p:cNvGrpSpPr/>
-        <p:nvPr/>
-      </p:nvGrpSpPr>
-      <p:grpSpPr>
-        <a:xfrm>
-          <a:off x="0" y="0"/>
-          <a:ext cx="0" cy="0"/>
-          <a:chOff x="0" y="0"/>
-          <a:chExt cx="0" cy="0"/>
-        </a:xfrm>
-      </p:grpSpPr>
-      <p:sp>
-        <p:nvSpPr>
-          <p:cNvPr id="2" name="Title 1">
-            <a:extLst>
-              <a:ext uri="{FF2B5EF4-FFF2-40B4-BE49-F238E27FC236}">
-                <a16:creationId xmlns:a16="http://schemas.microsoft.com/office/drawing/2014/main" id="{A8531199-B88E-427B-A9A4-BDD920A5C605}"/>
-              </a:ext>
-            </a:extLst>
-          </p:cNvPr>
-          <p:cNvSpPr>
-            <a:spLocks noGrp="1"/>
-          </p:cNvSpPr>
-          <p:nvPr>
-            <p:ph type="title"/>
-          </p:nvPr>
-        </p:nvSpPr>
-        <p:spPr>
-          <a:xfrm>
-            <a:off x="829322" y="365125"/>
-            <a:ext cx="10515600" cy="1325563"/>
-          </a:xfrm>
-        </p:spPr>
-        <p:txBody>
-          <a:bodyPr>
-            <a:normAutofit/>
-          </a:bodyPr>
-          <a:lstStyle/>
-          <a:p>
-            <a:pPr algn="ctr"/>
-            <a:r>
-              <a:rPr lang="es-AR" sz="3600" dirty="0" err="1"/>
-              <a:t>Method</a:t>
-            </a:r>
-            <a:r>
-              <a:rPr lang="es-AR" sz="3600" dirty="0"/>
-              <a:t> 2: </a:t>
-            </a:r>
-            <a:r>
-              <a:rPr lang="es-AR" sz="3600" dirty="0" err="1"/>
-              <a:t>Update</a:t>
-            </a:r>
-            <a:r>
-              <a:rPr lang="es-AR" sz="3600" dirty="0"/>
-              <a:t> at </a:t>
-            </a:r>
-            <a:r>
-              <a:rPr lang="es-AR" sz="3600" dirty="0" err="1"/>
-              <a:t>every</a:t>
-            </a:r>
-            <a:r>
-              <a:rPr lang="es-AR" sz="3600" dirty="0"/>
-              <a:t> time step (T = 5000)</a:t>
-            </a:r>
-            <a:br>
-              <a:rPr lang="es-AR" sz="3600" dirty="0"/>
-            </a:br>
-            <a:r>
-              <a:rPr lang="es-AR" sz="3600" dirty="0"/>
-              <a:t>(</a:t>
-            </a:r>
-            <a:r>
-              <a:rPr lang="es-AR" sz="3600" dirty="0">
-                <a:sym typeface="Symbol" panose="05050102010706020507" pitchFamily="18" charset="2"/>
-              </a:rPr>
-              <a:t> = 1/T, </a:t>
-            </a:r>
-            <a:r>
-              <a:rPr lang="en-IE" sz="3600" dirty="0">
-                <a:sym typeface="Symbol" panose="05050102010706020507" pitchFamily="18" charset="2"/>
-              </a:rPr>
-              <a:t>|</a:t>
-            </a:r>
-            <a:r>
-              <a:rPr lang="en-IE" sz="3600" dirty="0"/>
-              <a:t>delta(</a:t>
-            </a:r>
-            <a:r>
-              <a:rPr lang="en-IE" sz="3600" dirty="0">
-                <a:sym typeface="Symbol" panose="05050102010706020507" pitchFamily="18" charset="2"/>
-              </a:rPr>
-              <a:t>)| &lt;= 1.131</a:t>
-            </a:r>
-            <a:r>
-              <a:rPr lang="es-AR" sz="3600" dirty="0">
-                <a:sym typeface="Symbol" panose="05050102010706020507" pitchFamily="18" charset="2"/>
-              </a:rPr>
-              <a:t>)</a:t>
-            </a:r>
-            <a:endParaRPr lang="en-IE" sz="3600" dirty="0"/>
-          </a:p>
-        </p:txBody>
-      </p:sp>
-      <p:pic>
-        <p:nvPicPr>
-          <p:cNvPr id="5" name="Picture 4">
-            <a:extLst>
-              <a:ext uri="{FF2B5EF4-FFF2-40B4-BE49-F238E27FC236}">
-                <a16:creationId xmlns:a16="http://schemas.microsoft.com/office/drawing/2014/main" id="{771AED9E-CECE-4C4A-B794-3E77B64C0D01}"/>
-              </a:ext>
-            </a:extLst>
-          </p:cNvPr>
-          <p:cNvPicPr>
-            <a:picLocks noChangeAspect="1"/>
-          </p:cNvPicPr>
-          <p:nvPr/>
-        </p:nvPicPr>
-        <p:blipFill>
-          <a:blip r:embed="rId2"/>
-          <a:stretch>
-            <a:fillRect/>
-          </a:stretch>
-        </p:blipFill>
-        <p:spPr>
-          <a:xfrm>
-            <a:off x="1597980" y="1690688"/>
-            <a:ext cx="9510944" cy="4711683"/>
-          </a:xfrm>
-          <a:prstGeom prst="rect">
-            <a:avLst/>
-          </a:prstGeom>
-        </p:spPr>
-      </p:pic>
-      <p:pic>
-        <p:nvPicPr>
-          <p:cNvPr id="6" name="Picture 5">
-            <a:extLst>
-              <a:ext uri="{FF2B5EF4-FFF2-40B4-BE49-F238E27FC236}">
-                <a16:creationId xmlns:a16="http://schemas.microsoft.com/office/drawing/2014/main" id="{61762BA6-5250-47F0-B9EA-4EEF44BC0938}"/>
-              </a:ext>
-            </a:extLst>
-          </p:cNvPr>
-          <p:cNvPicPr>
-            <a:picLocks noChangeAspect="1"/>
-          </p:cNvPicPr>
-          <p:nvPr/>
-        </p:nvPicPr>
-        <p:blipFill>
-          <a:blip r:embed="rId3"/>
-          <a:stretch>
-            <a:fillRect/>
-          </a:stretch>
-        </p:blipFill>
-        <p:spPr>
-          <a:xfrm>
-            <a:off x="6706863" y="2174285"/>
-            <a:ext cx="3416640" cy="1683931"/>
-          </a:xfrm>
-          <a:prstGeom prst="rect">
-            <a:avLst/>
-          </a:prstGeom>
-        </p:spPr>
-      </p:pic>
-    </p:spTree>
-    <p:extLst>
-      <p:ext uri="{BB962C8B-B14F-4D97-AF65-F5344CB8AC3E}">
-        <p14:creationId xmlns:p14="http://schemas.microsoft.com/office/powerpoint/2010/main" val="3361400706"/>
-      </p:ext>
-    </p:extLst>
-  </p:cSld>
-  <p:clrMapOvr>
-    <a:masterClrMapping/>
-  </p:clrMapOvr>
-</p:sld>
-</file>
-
-<file path=ppt/slides/slide8.xml><?xml version="1.0" encoding="utf-8"?>
-<p:sld xmlns:a="http://schemas.openxmlformats.org/drawingml/2006/main" xmlns:r="http://schemas.openxmlformats.org/officeDocument/2006/relationships" xmlns:p="http://schemas.openxmlformats.org/presentationml/2006/main">
-  <p:cSld>
-    <p:spTree>
-      <p:nvGrpSpPr>
-        <p:cNvPr id="1" name=""/>
-        <p:cNvGrpSpPr/>
-        <p:nvPr/>
-      </p:nvGrpSpPr>
-      <p:grpSpPr>
-        <a:xfrm>
-          <a:off x="0" y="0"/>
-          <a:ext cx="0" cy="0"/>
-          <a:chOff x="0" y="0"/>
-          <a:chExt cx="0" cy="0"/>
-        </a:xfrm>
-      </p:grpSpPr>
-      <p:sp>
-        <p:nvSpPr>
-          <p:cNvPr id="2" name="Title 1">
-            <a:extLst>
-              <a:ext uri="{FF2B5EF4-FFF2-40B4-BE49-F238E27FC236}">
-                <a16:creationId xmlns:a16="http://schemas.microsoft.com/office/drawing/2014/main" id="{A8531199-B88E-427B-A9A4-BDD920A5C605}"/>
-              </a:ext>
-            </a:extLst>
-          </p:cNvPr>
-          <p:cNvSpPr>
-            <a:spLocks noGrp="1"/>
-          </p:cNvSpPr>
-          <p:nvPr>
-            <p:ph type="title"/>
-          </p:nvPr>
-        </p:nvSpPr>
-        <p:spPr>
-          <a:xfrm>
-            <a:off x="829322" y="365125"/>
-            <a:ext cx="10515600" cy="1325563"/>
-          </a:xfrm>
-        </p:spPr>
-        <p:txBody>
-          <a:bodyPr>
-            <a:normAutofit fontScale="90000"/>
-          </a:bodyPr>
-          <a:lstStyle/>
-          <a:p>
-            <a:pPr algn="ctr"/>
-            <a:r>
-              <a:rPr lang="es-AR" sz="4000" dirty="0" err="1"/>
-              <a:t>Method</a:t>
-            </a:r>
-            <a:r>
-              <a:rPr lang="es-AR" sz="4000" dirty="0"/>
-              <a:t> 1: </a:t>
-            </a:r>
-            <a:r>
-              <a:rPr lang="es-AR" sz="4000" dirty="0" err="1"/>
-              <a:t>Update</a:t>
-            </a:r>
-            <a:r>
-              <a:rPr lang="es-AR" sz="4000" dirty="0"/>
-              <a:t> once at </a:t>
-            </a:r>
-            <a:r>
-              <a:rPr lang="es-AR" sz="4000" dirty="0" err="1"/>
-              <a:t>end</a:t>
-            </a:r>
-            <a:r>
-              <a:rPr lang="es-AR" sz="4000" dirty="0"/>
-              <a:t> </a:t>
-            </a:r>
-            <a:r>
-              <a:rPr lang="es-AR" sz="4000" dirty="0" err="1"/>
-              <a:t>of</a:t>
-            </a:r>
-            <a:r>
-              <a:rPr lang="es-AR" sz="4000" dirty="0"/>
-              <a:t> </a:t>
-            </a:r>
-            <a:r>
-              <a:rPr lang="es-AR" sz="4000" dirty="0" err="1"/>
-              <a:t>episode</a:t>
-            </a:r>
-            <a:r>
-              <a:rPr lang="es-AR" sz="4000" dirty="0"/>
-              <a:t> (T=5000)</a:t>
-            </a:r>
-            <a:br>
-              <a:rPr lang="es-AR" sz="4000" dirty="0"/>
-            </a:br>
-            <a:r>
-              <a:rPr lang="es-AR" sz="4000" dirty="0"/>
-              <a:t>(</a:t>
-            </a:r>
-            <a:r>
-              <a:rPr lang="es-AR" sz="4000" dirty="0">
-                <a:sym typeface="Symbol" panose="05050102010706020507" pitchFamily="18" charset="2"/>
-              </a:rPr>
-              <a:t>=1, </a:t>
-            </a:r>
-            <a:r>
-              <a:rPr lang="es-AR" sz="4000" dirty="0"/>
-              <a:t>no </a:t>
-            </a:r>
-            <a:r>
-              <a:rPr lang="es-AR" sz="4000" dirty="0" err="1"/>
-              <a:t>constraint</a:t>
-            </a:r>
-            <a:r>
-              <a:rPr lang="es-AR" sz="4000" dirty="0"/>
-              <a:t> </a:t>
-            </a:r>
-            <a:r>
-              <a:rPr lang="es-AR" sz="4000" dirty="0" err="1"/>
-              <a:t>on</a:t>
-            </a:r>
-            <a:r>
-              <a:rPr lang="es-AR" sz="4000" dirty="0"/>
-              <a:t> delta(</a:t>
-            </a:r>
-            <a:r>
-              <a:rPr lang="es-AR" sz="4000" dirty="0">
-                <a:sym typeface="Symbol" panose="05050102010706020507" pitchFamily="18" charset="2"/>
-              </a:rPr>
-              <a:t>))</a:t>
-            </a:r>
-            <a:endParaRPr lang="en-IE" sz="4000" dirty="0"/>
-          </a:p>
-        </p:txBody>
-      </p:sp>
-      <p:pic>
-        <p:nvPicPr>
-          <p:cNvPr id="3" name="Picture 2">
-            <a:extLst>
-              <a:ext uri="{FF2B5EF4-FFF2-40B4-BE49-F238E27FC236}">
-                <a16:creationId xmlns:a16="http://schemas.microsoft.com/office/drawing/2014/main" id="{9E1873BC-4C5F-4577-A04C-8C4C45FC5ACB}"/>
-              </a:ext>
-            </a:extLst>
-          </p:cNvPr>
-          <p:cNvPicPr>
-            <a:picLocks noChangeAspect="1"/>
-          </p:cNvPicPr>
-          <p:nvPr/>
-        </p:nvPicPr>
-        <p:blipFill>
-          <a:blip r:embed="rId2"/>
-          <a:stretch>
-            <a:fillRect/>
-          </a:stretch>
-        </p:blipFill>
-        <p:spPr>
-          <a:xfrm>
-            <a:off x="1819920" y="1934110"/>
+            <a:off x="1854446" y="1934110"/>
             <a:ext cx="9241655" cy="4558765"/>
           </a:xfrm>
           <a:prstGeom prst="rect">
@@ -5203,7 +5761,7 @@
 </p:sld>
 </file>
 
-<file path=ppt/slides/slide9.xml><?xml version="1.0" encoding="utf-8"?>
+<file path=ppt/slides/slide7.xml><?xml version="1.0" encoding="utf-8"?>
 <p:sld xmlns:a="http://schemas.openxmlformats.org/drawingml/2006/main" xmlns:r="http://schemas.openxmlformats.org/officeDocument/2006/relationships" xmlns:p="http://schemas.openxmlformats.org/presentationml/2006/main">
   <p:cSld>
     <p:spTree>
@@ -5271,7 +5829,7 @@
             </a:r>
             <a:r>
               <a:rPr lang="es-AR" sz="3600" dirty="0"/>
-              <a:t> time step (T = 5000)</a:t>
+              <a:t> time step (T = 5,000)</a:t>
             </a:r>
             <a:br>
               <a:rPr lang="es-AR" sz="3600" dirty="0"/>
@@ -5380,6 +5938,354 @@
     <p:extLst>
       <p:ext uri="{BB962C8B-B14F-4D97-AF65-F5344CB8AC3E}">
         <p14:creationId xmlns:p14="http://schemas.microsoft.com/office/powerpoint/2010/main" val="2559893533"/>
+      </p:ext>
+    </p:extLst>
+  </p:cSld>
+  <p:clrMapOvr>
+    <a:masterClrMapping/>
+  </p:clrMapOvr>
+</p:sld>
+</file>
+
+<file path=ppt/slides/slide8.xml><?xml version="1.0" encoding="utf-8"?>
+<p:sld xmlns:a="http://schemas.openxmlformats.org/drawingml/2006/main" xmlns:r="http://schemas.openxmlformats.org/officeDocument/2006/relationships" xmlns:p="http://schemas.openxmlformats.org/presentationml/2006/main">
+  <p:cSld>
+    <p:spTree>
+      <p:nvGrpSpPr>
+        <p:cNvPr id="1" name=""/>
+        <p:cNvGrpSpPr/>
+        <p:nvPr/>
+      </p:nvGrpSpPr>
+      <p:grpSpPr>
+        <a:xfrm>
+          <a:off x="0" y="0"/>
+          <a:ext cx="0" cy="0"/>
+          <a:chOff x="0" y="0"/>
+          <a:chExt cx="0" cy="0"/>
+        </a:xfrm>
+      </p:grpSpPr>
+      <p:sp>
+        <p:nvSpPr>
+          <p:cNvPr id="2" name="Title 1">
+            <a:extLst>
+              <a:ext uri="{FF2B5EF4-FFF2-40B4-BE49-F238E27FC236}">
+                <a16:creationId xmlns:a16="http://schemas.microsoft.com/office/drawing/2014/main" id="{A8531199-B88E-427B-A9A4-BDD920A5C605}"/>
+              </a:ext>
+            </a:extLst>
+          </p:cNvPr>
+          <p:cNvSpPr>
+            <a:spLocks noGrp="1"/>
+          </p:cNvSpPr>
+          <p:nvPr>
+            <p:ph type="title"/>
+          </p:nvPr>
+        </p:nvSpPr>
+        <p:spPr>
+          <a:xfrm>
+            <a:off x="829322" y="365125"/>
+            <a:ext cx="10515600" cy="1325563"/>
+          </a:xfrm>
+        </p:spPr>
+        <p:txBody>
+          <a:bodyPr>
+            <a:normAutofit/>
+          </a:bodyPr>
+          <a:lstStyle/>
+          <a:p>
+            <a:pPr algn="ctr"/>
+            <a:r>
+              <a:rPr lang="es-AR" sz="3600" dirty="0" err="1"/>
+              <a:t>Method</a:t>
+            </a:r>
+            <a:r>
+              <a:rPr lang="es-AR" sz="3600" dirty="0"/>
+              <a:t> 3: </a:t>
+            </a:r>
+            <a:r>
+              <a:rPr lang="es-AR" sz="3600" dirty="0" err="1"/>
+              <a:t>Update</a:t>
+            </a:r>
+            <a:r>
+              <a:rPr lang="es-AR" sz="3600" dirty="0"/>
+              <a:t> once at </a:t>
+            </a:r>
+            <a:r>
+              <a:rPr lang="es-AR" sz="3600" dirty="0" err="1"/>
+              <a:t>end</a:t>
+            </a:r>
+            <a:r>
+              <a:rPr lang="es-AR" sz="3600" dirty="0"/>
+              <a:t> </a:t>
+            </a:r>
+            <a:r>
+              <a:rPr lang="es-AR" sz="3600" dirty="0" err="1"/>
+              <a:t>of</a:t>
+            </a:r>
+            <a:r>
+              <a:rPr lang="es-AR" sz="3600" dirty="0"/>
+              <a:t> </a:t>
+            </a:r>
+            <a:r>
+              <a:rPr lang="es-AR" sz="3600" dirty="0" err="1"/>
+              <a:t>episode</a:t>
+            </a:r>
+            <a:r>
+              <a:rPr lang="es-AR" sz="3600" dirty="0"/>
+              <a:t> (T = 10,000)</a:t>
+            </a:r>
+            <a:br>
+              <a:rPr lang="es-AR" sz="3600" dirty="0"/>
+            </a:br>
+            <a:r>
+              <a:rPr lang="es-AR" sz="3600" dirty="0"/>
+              <a:t>(</a:t>
+            </a:r>
+            <a:r>
+              <a:rPr lang="es-AR" sz="3600" dirty="0">
+                <a:sym typeface="Symbol" panose="05050102010706020507" pitchFamily="18" charset="2"/>
+              </a:rPr>
+              <a:t> = 1, </a:t>
+            </a:r>
+            <a:r>
+              <a:rPr lang="en-IE" sz="3600" dirty="0">
+                <a:sym typeface="Symbol" panose="05050102010706020507" pitchFamily="18" charset="2"/>
+              </a:rPr>
+              <a:t>no constraint on </a:t>
+            </a:r>
+            <a:r>
+              <a:rPr lang="en-IE" sz="3600" dirty="0"/>
+              <a:t>delta(</a:t>
+            </a:r>
+            <a:r>
+              <a:rPr lang="en-IE" sz="3600" dirty="0">
+                <a:sym typeface="Symbol" panose="05050102010706020507" pitchFamily="18" charset="2"/>
+              </a:rPr>
+              <a:t>)</a:t>
+            </a:r>
+            <a:r>
+              <a:rPr lang="es-AR" sz="3600" dirty="0">
+                <a:sym typeface="Symbol" panose="05050102010706020507" pitchFamily="18" charset="2"/>
+              </a:rPr>
+              <a:t>)</a:t>
+            </a:r>
+            <a:endParaRPr lang="en-IE" sz="3600" dirty="0"/>
+          </a:p>
+        </p:txBody>
+      </p:sp>
+      <p:pic>
+        <p:nvPicPr>
+          <p:cNvPr id="3" name="Picture 2">
+            <a:extLst>
+              <a:ext uri="{FF2B5EF4-FFF2-40B4-BE49-F238E27FC236}">
+                <a16:creationId xmlns:a16="http://schemas.microsoft.com/office/drawing/2014/main" id="{60E043C7-219F-4820-B634-B59C83FCD361}"/>
+              </a:ext>
+            </a:extLst>
+          </p:cNvPr>
+          <p:cNvPicPr>
+            <a:picLocks noChangeAspect="1"/>
+          </p:cNvPicPr>
+          <p:nvPr/>
+        </p:nvPicPr>
+        <p:blipFill>
+          <a:blip r:embed="rId2"/>
+          <a:stretch>
+            <a:fillRect/>
+          </a:stretch>
+        </p:blipFill>
+        <p:spPr>
+          <a:xfrm>
+            <a:off x="1412240" y="1782883"/>
+            <a:ext cx="9367520" cy="4709992"/>
+          </a:xfrm>
+          <a:prstGeom prst="rect">
+            <a:avLst/>
+          </a:prstGeom>
+        </p:spPr>
+      </p:pic>
+      <p:pic>
+        <p:nvPicPr>
+          <p:cNvPr id="4" name="Picture 3">
+            <a:extLst>
+              <a:ext uri="{FF2B5EF4-FFF2-40B4-BE49-F238E27FC236}">
+                <a16:creationId xmlns:a16="http://schemas.microsoft.com/office/drawing/2014/main" id="{AEE59FBC-9F4C-4CD9-8A01-79F69C1CAFE5}"/>
+              </a:ext>
+            </a:extLst>
+          </p:cNvPr>
+          <p:cNvPicPr>
+            <a:picLocks noChangeAspect="1"/>
+          </p:cNvPicPr>
+          <p:nvPr/>
+        </p:nvPicPr>
+        <p:blipFill>
+          <a:blip r:embed="rId3"/>
+          <a:stretch>
+            <a:fillRect/>
+          </a:stretch>
+        </p:blipFill>
+        <p:spPr>
+          <a:xfrm>
+            <a:off x="6961518" y="2113280"/>
+            <a:ext cx="3171870" cy="1584960"/>
+          </a:xfrm>
+          <a:prstGeom prst="rect">
+            <a:avLst/>
+          </a:prstGeom>
+        </p:spPr>
+      </p:pic>
+    </p:spTree>
+    <p:extLst>
+      <p:ext uri="{BB962C8B-B14F-4D97-AF65-F5344CB8AC3E}">
+        <p14:creationId xmlns:p14="http://schemas.microsoft.com/office/powerpoint/2010/main" val="1381396555"/>
+      </p:ext>
+    </p:extLst>
+  </p:cSld>
+  <p:clrMapOvr>
+    <a:masterClrMapping/>
+  </p:clrMapOvr>
+</p:sld>
+</file>
+
+<file path=ppt/slides/slide9.xml><?xml version="1.0" encoding="utf-8"?>
+<p:sld xmlns:a="http://schemas.openxmlformats.org/drawingml/2006/main" xmlns:r="http://schemas.openxmlformats.org/officeDocument/2006/relationships" xmlns:p="http://schemas.openxmlformats.org/presentationml/2006/main">
+  <p:cSld>
+    <p:spTree>
+      <p:nvGrpSpPr>
+        <p:cNvPr id="1" name=""/>
+        <p:cNvGrpSpPr/>
+        <p:nvPr/>
+      </p:nvGrpSpPr>
+      <p:grpSpPr>
+        <a:xfrm>
+          <a:off x="0" y="0"/>
+          <a:ext cx="0" cy="0"/>
+          <a:chOff x="0" y="0"/>
+          <a:chExt cx="0" cy="0"/>
+        </a:xfrm>
+      </p:grpSpPr>
+      <p:sp>
+        <p:nvSpPr>
+          <p:cNvPr id="2" name="Title 1">
+            <a:extLst>
+              <a:ext uri="{FF2B5EF4-FFF2-40B4-BE49-F238E27FC236}">
+                <a16:creationId xmlns:a16="http://schemas.microsoft.com/office/drawing/2014/main" id="{A8531199-B88E-427B-A9A4-BDD920A5C605}"/>
+              </a:ext>
+            </a:extLst>
+          </p:cNvPr>
+          <p:cNvSpPr>
+            <a:spLocks noGrp="1"/>
+          </p:cNvSpPr>
+          <p:nvPr>
+            <p:ph type="title"/>
+          </p:nvPr>
+        </p:nvSpPr>
+        <p:spPr>
+          <a:xfrm>
+            <a:off x="829322" y="365125"/>
+            <a:ext cx="10515600" cy="1325563"/>
+          </a:xfrm>
+        </p:spPr>
+        <p:txBody>
+          <a:bodyPr>
+            <a:noAutofit/>
+          </a:bodyPr>
+          <a:lstStyle/>
+          <a:p>
+            <a:pPr algn="ctr"/>
+            <a:r>
+              <a:rPr lang="en-IE" sz="3600" dirty="0"/>
+              <a:t>Method 1: Update once at end of episode (T = 5,000)</a:t>
+            </a:r>
+            <a:br>
+              <a:rPr lang="en-IE" sz="3600" dirty="0"/>
+            </a:br>
+            <a:r>
+              <a:rPr lang="en-IE" sz="3600" dirty="0"/>
+              <a:t>(</a:t>
+            </a:r>
+            <a:r>
+              <a:rPr lang="en-IE" sz="3600" dirty="0">
+                <a:sym typeface="Symbol" panose="05050102010706020507" pitchFamily="18" charset="2"/>
+              </a:rPr>
+              <a:t> = 1, |</a:t>
+            </a:r>
+            <a:r>
+              <a:rPr lang="en-IE" sz="3600" dirty="0"/>
+              <a:t>delta(</a:t>
+            </a:r>
+            <a:r>
+              <a:rPr lang="en-IE" sz="3600" dirty="0">
+                <a:sym typeface="Symbol" panose="05050102010706020507" pitchFamily="18" charset="2"/>
+              </a:rPr>
+              <a:t>)| &lt;= 1.131)</a:t>
+            </a:r>
+            <a:endParaRPr lang="en-IE" sz="3600" dirty="0"/>
+          </a:p>
+        </p:txBody>
+      </p:sp>
+      <p:pic>
+        <p:nvPicPr>
+          <p:cNvPr id="6" name="Picture 5">
+            <a:extLst>
+              <a:ext uri="{FF2B5EF4-FFF2-40B4-BE49-F238E27FC236}">
+                <a16:creationId xmlns:a16="http://schemas.microsoft.com/office/drawing/2014/main" id="{1EB16F07-9B03-4C60-9F23-C8AB252C1007}"/>
+              </a:ext>
+            </a:extLst>
+          </p:cNvPr>
+          <p:cNvPicPr>
+            <a:picLocks noChangeAspect="1"/>
+          </p:cNvPicPr>
+          <p:nvPr/>
+        </p:nvPicPr>
+        <p:blipFill>
+          <a:blip r:embed="rId2"/>
+          <a:stretch>
+            <a:fillRect/>
+          </a:stretch>
+        </p:blipFill>
+        <p:spPr>
+          <a:xfrm>
+            <a:off x="1597980" y="1805074"/>
+            <a:ext cx="9360023" cy="4605907"/>
+          </a:xfrm>
+          <a:prstGeom prst="rect">
+            <a:avLst/>
+          </a:prstGeom>
+        </p:spPr>
+      </p:pic>
+      <p:pic>
+        <p:nvPicPr>
+          <p:cNvPr id="7" name="Picture 6">
+            <a:extLst>
+              <a:ext uri="{FF2B5EF4-FFF2-40B4-BE49-F238E27FC236}">
+                <a16:creationId xmlns:a16="http://schemas.microsoft.com/office/drawing/2014/main" id="{7B6F31BF-C6EE-47AE-A029-C20D63D3AB7C}"/>
+              </a:ext>
+            </a:extLst>
+          </p:cNvPr>
+          <p:cNvPicPr>
+            <a:picLocks noChangeAspect="1"/>
+          </p:cNvPicPr>
+          <p:nvPr/>
+        </p:nvPicPr>
+        <p:blipFill>
+          <a:blip r:embed="rId3"/>
+          <a:stretch>
+            <a:fillRect/>
+          </a:stretch>
+        </p:blipFill>
+        <p:spPr>
+          <a:xfrm>
+            <a:off x="6800494" y="2353355"/>
+            <a:ext cx="3251780" cy="1606086"/>
+          </a:xfrm>
+          <a:prstGeom prst="rect">
+            <a:avLst/>
+          </a:prstGeom>
+        </p:spPr>
+      </p:pic>
+    </p:spTree>
+    <p:extLst>
+      <p:ext uri="{BB962C8B-B14F-4D97-AF65-F5344CB8AC3E}">
+        <p14:creationId xmlns:p14="http://schemas.microsoft.com/office/powerpoint/2010/main" val="2802122110"/>
       </p:ext>
     </p:extLst>
   </p:cSld>

</xml_diff>

<commit_message>
[FV-RL] New and updated documents summarizing results and findings
G_Method1_vs_Method3.xlsx:
Compares the results of method 1 (G(t) on shrinking window)) vs. method 3 (G(t) on fixed-size window) to show that method 3 is not really appropriate.

tmp_202111Nov25_CompareG(t)BeforeAndAfterTransitionsOnlyOnJobArrival.xlsx:
Compares G(t) before and after the change in the implementation of the embedded Markov chain which defines time steps as the times of job arrival only (not of service events).

tmp_202110Oct25_RLPolicyGradient_SmallChanges.txt:
Describes different changes tried on the algorithm in order to obtain convergence.
</commit_message>
<xml_diff>
--- a/RL-002-QueueBlocking/results/RL-SingleServer-PolicyGradient-Results-202111Nov16-MonteCarloOnSmallTheta.pptx
+++ b/RL-002-QueueBlocking/results/RL-SingleServer-PolicyGradient-Results-202111Nov16-MonteCarloOnSmallTheta.pptx
@@ -21,6 +21,8 @@
     <p:sldId id="259" r:id="rId15"/>
     <p:sldId id="266" r:id="rId16"/>
     <p:sldId id="269" r:id="rId17"/>
+    <p:sldId id="272" r:id="rId18"/>
+    <p:sldId id="274" r:id="rId19"/>
   </p:sldIdLst>
   <p:sldSz cx="12192000" cy="6858000"/>
   <p:notesSz cx="6858000" cy="9144000"/>
@@ -4423,6 +4425,384 @@
     <p:extLst>
       <p:ext uri="{BB962C8B-B14F-4D97-AF65-F5344CB8AC3E}">
         <p14:creationId xmlns:p14="http://schemas.microsoft.com/office/powerpoint/2010/main" val="3839697555"/>
+      </p:ext>
+    </p:extLst>
+  </p:cSld>
+  <p:clrMapOvr>
+    <a:masterClrMapping/>
+  </p:clrMapOvr>
+</p:sld>
+</file>
+
+<file path=ppt/slides/slide17.xml><?xml version="1.0" encoding="utf-8"?>
+<p:sld xmlns:a="http://schemas.openxmlformats.org/drawingml/2006/main" xmlns:r="http://schemas.openxmlformats.org/officeDocument/2006/relationships" xmlns:p="http://schemas.openxmlformats.org/presentationml/2006/main">
+  <p:cSld>
+    <p:spTree>
+      <p:nvGrpSpPr>
+        <p:cNvPr id="1" name=""/>
+        <p:cNvGrpSpPr/>
+        <p:nvPr/>
+      </p:nvGrpSpPr>
+      <p:grpSpPr>
+        <a:xfrm>
+          <a:off x="0" y="0"/>
+          <a:ext cx="0" cy="0"/>
+          <a:chOff x="0" y="0"/>
+          <a:chExt cx="0" cy="0"/>
+        </a:xfrm>
+      </p:grpSpPr>
+      <p:sp>
+        <p:nvSpPr>
+          <p:cNvPr id="2" name="Title 1">
+            <a:extLst>
+              <a:ext uri="{FF2B5EF4-FFF2-40B4-BE49-F238E27FC236}">
+                <a16:creationId xmlns:a16="http://schemas.microsoft.com/office/drawing/2014/main" id="{C8A9C049-B40E-443D-8ABF-9526417ECF88}"/>
+              </a:ext>
+            </a:extLst>
+          </p:cNvPr>
+          <p:cNvSpPr>
+            <a:spLocks noGrp="1"/>
+          </p:cNvSpPr>
+          <p:nvPr>
+            <p:ph type="title"/>
+          </p:nvPr>
+        </p:nvSpPr>
+        <p:spPr/>
+        <p:txBody>
+          <a:bodyPr/>
+          <a:lstStyle/>
+          <a:p>
+            <a:r>
+              <a:rPr lang="es-AR" dirty="0" err="1"/>
+              <a:t>Thu</a:t>
+            </a:r>
+            <a:r>
+              <a:rPr lang="es-AR"/>
+              <a:t>, 25-Nov-2021</a:t>
+            </a:r>
+            <a:br>
+              <a:rPr lang="es-AR"/>
+            </a:br>
+            <a:r>
+              <a:rPr lang="es-AR"/>
+              <a:t>After </a:t>
+            </a:r>
+            <a:r>
+              <a:rPr lang="es-AR" dirty="0" err="1"/>
+              <a:t>fixing</a:t>
+            </a:r>
+            <a:r>
+              <a:rPr lang="es-AR" dirty="0"/>
+              <a:t> </a:t>
+            </a:r>
+            <a:r>
+              <a:rPr lang="es-AR" dirty="0" err="1"/>
+              <a:t>discrete</a:t>
+            </a:r>
+            <a:r>
+              <a:rPr lang="es-AR" dirty="0"/>
+              <a:t>-time </a:t>
+            </a:r>
+            <a:r>
+              <a:rPr lang="es-AR" dirty="0" err="1"/>
+              <a:t>indices</a:t>
+            </a:r>
+            <a:endParaRPr lang="en-IE" dirty="0"/>
+          </a:p>
+        </p:txBody>
+      </p:sp>
+      <p:sp>
+        <p:nvSpPr>
+          <p:cNvPr id="3" name="Text Placeholder 2">
+            <a:extLst>
+              <a:ext uri="{FF2B5EF4-FFF2-40B4-BE49-F238E27FC236}">
+                <a16:creationId xmlns:a16="http://schemas.microsoft.com/office/drawing/2014/main" id="{EC04160C-1923-48C3-8E6A-FB07115C7AB1}"/>
+              </a:ext>
+            </a:extLst>
+          </p:cNvPr>
+          <p:cNvSpPr>
+            <a:spLocks noGrp="1"/>
+          </p:cNvSpPr>
+          <p:nvPr>
+            <p:ph type="body" idx="1"/>
+          </p:nvPr>
+        </p:nvSpPr>
+        <p:spPr/>
+        <p:txBody>
+          <a:bodyPr/>
+          <a:lstStyle/>
+          <a:p>
+            <a:r>
+              <a:rPr lang="es-AR" dirty="0" err="1"/>
+              <a:t>That</a:t>
+            </a:r>
+            <a:r>
+              <a:rPr lang="es-AR" dirty="0"/>
+              <a:t> </a:t>
+            </a:r>
+            <a:r>
+              <a:rPr lang="es-AR" dirty="0" err="1"/>
+              <a:t>is</a:t>
+            </a:r>
+            <a:r>
+              <a:rPr lang="es-AR" dirty="0"/>
+              <a:t>, </a:t>
+            </a:r>
+            <a:r>
+              <a:rPr lang="es-AR" dirty="0" err="1"/>
+              <a:t>each</a:t>
+            </a:r>
+            <a:r>
+              <a:rPr lang="es-AR" dirty="0"/>
+              <a:t> </a:t>
+            </a:r>
+            <a:r>
+              <a:rPr lang="es-AR" dirty="0" err="1"/>
+              <a:t>discrete</a:t>
+            </a:r>
+            <a:r>
+              <a:rPr lang="es-AR" dirty="0"/>
+              <a:t>-time </a:t>
+            </a:r>
+            <a:r>
+              <a:rPr lang="es-AR" dirty="0" err="1"/>
+              <a:t>index</a:t>
+            </a:r>
+            <a:r>
+              <a:rPr lang="es-AR" dirty="0"/>
+              <a:t> </a:t>
+            </a:r>
+            <a:r>
+              <a:rPr lang="es-AR" dirty="0" err="1"/>
+              <a:t>is</a:t>
+            </a:r>
+            <a:r>
+              <a:rPr lang="es-AR" dirty="0"/>
+              <a:t> </a:t>
+            </a:r>
+            <a:r>
+              <a:rPr lang="es-AR" dirty="0" err="1"/>
+              <a:t>defined</a:t>
+            </a:r>
+            <a:r>
+              <a:rPr lang="es-AR" dirty="0"/>
+              <a:t> </a:t>
+            </a:r>
+            <a:r>
+              <a:rPr lang="es-AR" dirty="0" err="1"/>
+              <a:t>by</a:t>
+            </a:r>
+            <a:r>
+              <a:rPr lang="es-AR" dirty="0"/>
+              <a:t> a new </a:t>
+            </a:r>
+            <a:r>
+              <a:rPr lang="es-AR" dirty="0" err="1"/>
+              <a:t>job</a:t>
+            </a:r>
+            <a:r>
+              <a:rPr lang="es-AR" dirty="0"/>
+              <a:t> </a:t>
+            </a:r>
+            <a:r>
+              <a:rPr lang="es-AR" dirty="0" err="1"/>
+              <a:t>arrival</a:t>
+            </a:r>
+            <a:r>
+              <a:rPr lang="es-AR" dirty="0"/>
+              <a:t>, </a:t>
+            </a:r>
+            <a:r>
+              <a:rPr lang="es-AR" dirty="0" err="1"/>
+              <a:t>but</a:t>
+            </a:r>
+            <a:r>
+              <a:rPr lang="es-AR" dirty="0"/>
+              <a:t> NOT </a:t>
+            </a:r>
+            <a:r>
+              <a:rPr lang="es-AR" dirty="0" err="1"/>
+              <a:t>by</a:t>
+            </a:r>
+            <a:r>
+              <a:rPr lang="es-AR" dirty="0"/>
+              <a:t> a </a:t>
+            </a:r>
+            <a:r>
+              <a:rPr lang="es-AR" dirty="0" err="1"/>
+              <a:t>job</a:t>
+            </a:r>
+            <a:r>
+              <a:rPr lang="es-AR" dirty="0"/>
+              <a:t> </a:t>
+            </a:r>
+            <a:r>
+              <a:rPr lang="es-AR" dirty="0" err="1"/>
+              <a:t>being</a:t>
+            </a:r>
+            <a:r>
+              <a:rPr lang="es-AR" dirty="0"/>
+              <a:t> </a:t>
+            </a:r>
+            <a:r>
+              <a:rPr lang="es-AR" dirty="0" err="1"/>
+              <a:t>served</a:t>
+            </a:r>
+            <a:r>
+              <a:rPr lang="es-AR" dirty="0"/>
+              <a:t>.</a:t>
+            </a:r>
+            <a:endParaRPr lang="en-IE" dirty="0"/>
+          </a:p>
+        </p:txBody>
+      </p:sp>
+    </p:spTree>
+    <p:extLst>
+      <p:ext uri="{BB962C8B-B14F-4D97-AF65-F5344CB8AC3E}">
+        <p14:creationId xmlns:p14="http://schemas.microsoft.com/office/powerpoint/2010/main" val="4224561262"/>
+      </p:ext>
+    </p:extLst>
+  </p:cSld>
+  <p:clrMapOvr>
+    <a:masterClrMapping/>
+  </p:clrMapOvr>
+</p:sld>
+</file>
+
+<file path=ppt/slides/slide18.xml><?xml version="1.0" encoding="utf-8"?>
+<p:sld xmlns:a="http://schemas.openxmlformats.org/drawingml/2006/main" xmlns:r="http://schemas.openxmlformats.org/officeDocument/2006/relationships" xmlns:p="http://schemas.openxmlformats.org/presentationml/2006/main">
+  <p:cSld>
+    <p:spTree>
+      <p:nvGrpSpPr>
+        <p:cNvPr id="1" name=""/>
+        <p:cNvGrpSpPr/>
+        <p:nvPr/>
+      </p:nvGrpSpPr>
+      <p:grpSpPr>
+        <a:xfrm>
+          <a:off x="0" y="0"/>
+          <a:ext cx="0" cy="0"/>
+          <a:chOff x="0" y="0"/>
+          <a:chExt cx="0" cy="0"/>
+        </a:xfrm>
+      </p:grpSpPr>
+      <p:sp>
+        <p:nvSpPr>
+          <p:cNvPr id="2" name="Title 1">
+            <a:extLst>
+              <a:ext uri="{FF2B5EF4-FFF2-40B4-BE49-F238E27FC236}">
+                <a16:creationId xmlns:a16="http://schemas.microsoft.com/office/drawing/2014/main" id="{BD620344-D4C7-4DDC-B423-2F39728172BC}"/>
+              </a:ext>
+            </a:extLst>
+          </p:cNvPr>
+          <p:cNvSpPr>
+            <a:spLocks noGrp="1"/>
+          </p:cNvSpPr>
+          <p:nvPr>
+            <p:ph type="title"/>
+          </p:nvPr>
+        </p:nvSpPr>
+        <p:spPr/>
+        <p:txBody>
+          <a:bodyPr>
+            <a:normAutofit/>
+          </a:bodyPr>
+          <a:lstStyle/>
+          <a:p>
+            <a:pPr algn="ctr"/>
+            <a:r>
+              <a:rPr lang="en-IE" sz="3600" dirty="0"/>
+              <a:t>Method 1: T = 5,000, start at </a:t>
+            </a:r>
+            <a:r>
+              <a:rPr lang="en-IE" sz="3600" dirty="0">
+                <a:sym typeface="Symbol" panose="05050102010706020507" pitchFamily="18" charset="2"/>
+              </a:rPr>
+              <a:t> = 1.3 (small)</a:t>
+            </a:r>
+            <a:br>
+              <a:rPr lang="en-IE" sz="3600" dirty="0"/>
+            </a:br>
+            <a:r>
+              <a:rPr lang="en-IE" sz="3600" dirty="0"/>
+              <a:t>(</a:t>
+            </a:r>
+            <a:r>
+              <a:rPr lang="en-IE" sz="3600" dirty="0">
+                <a:sym typeface="Symbol" panose="05050102010706020507" pitchFamily="18" charset="2"/>
+              </a:rPr>
+              <a:t> = 1, </a:t>
+            </a:r>
+            <a:r>
+              <a:rPr lang="es-AR" sz="3600" dirty="0"/>
+              <a:t>no </a:t>
+            </a:r>
+            <a:r>
+              <a:rPr lang="es-AR" sz="3600" dirty="0" err="1"/>
+              <a:t>constraint</a:t>
+            </a:r>
+            <a:r>
+              <a:rPr lang="es-AR" sz="3600" dirty="0"/>
+              <a:t> </a:t>
+            </a:r>
+            <a:r>
+              <a:rPr lang="es-AR" sz="3600" dirty="0" err="1"/>
+              <a:t>on</a:t>
+            </a:r>
+            <a:r>
+              <a:rPr lang="es-AR" sz="3600" dirty="0"/>
+              <a:t> delta(</a:t>
+            </a:r>
+            <a:r>
+              <a:rPr lang="es-AR" sz="3600" dirty="0">
+                <a:sym typeface="Symbol" panose="05050102010706020507" pitchFamily="18" charset="2"/>
+              </a:rPr>
+              <a:t>)</a:t>
+            </a:r>
+            <a:r>
+              <a:rPr lang="en-IE" sz="3600" dirty="0">
+                <a:sym typeface="Symbol" panose="05050102010706020507" pitchFamily="18" charset="2"/>
+              </a:rPr>
+              <a:t>)</a:t>
+            </a:r>
+            <a:endParaRPr lang="en-IE" sz="3600" dirty="0"/>
+          </a:p>
+        </p:txBody>
+      </p:sp>
+      <p:pic>
+        <p:nvPicPr>
+          <p:cNvPr id="4" name="Picture 3">
+            <a:extLst>
+              <a:ext uri="{FF2B5EF4-FFF2-40B4-BE49-F238E27FC236}">
+                <a16:creationId xmlns:a16="http://schemas.microsoft.com/office/drawing/2014/main" id="{CF04B4DF-021D-4031-910F-8588AA8F97D1}"/>
+              </a:ext>
+            </a:extLst>
+          </p:cNvPr>
+          <p:cNvPicPr>
+            <a:picLocks noChangeAspect="1"/>
+          </p:cNvPicPr>
+          <p:nvPr/>
+        </p:nvPicPr>
+        <p:blipFill>
+          <a:blip r:embed="rId2"/>
+          <a:stretch>
+            <a:fillRect/>
+          </a:stretch>
+        </p:blipFill>
+        <p:spPr>
+          <a:xfrm>
+            <a:off x="1242291" y="1690688"/>
+            <a:ext cx="9707418" cy="4788279"/>
+          </a:xfrm>
+          <a:prstGeom prst="rect">
+            <a:avLst/>
+          </a:prstGeom>
+        </p:spPr>
+      </p:pic>
+    </p:spTree>
+    <p:extLst>
+      <p:ext uri="{BB962C8B-B14F-4D97-AF65-F5344CB8AC3E}">
+        <p14:creationId xmlns:p14="http://schemas.microsoft.com/office/powerpoint/2010/main" val="2345724121"/>
       </p:ext>
     </p:extLst>
   </p:cSld>

</xml_diff>